<commit_message>
Cambio en el título
</commit_message>
<xml_diff>
--- a/images/JECAS-portada-presentacion-ponencias.pptx
+++ b/images/JECAS-portada-presentacion-ponencias.pptx
@@ -197,7 +197,7 @@
           <a:p>
             <a:fld id="{2B267EE7-3F75-48C2-BAC4-D9DCD9BB6952}" type="datetimeFigureOut">
               <a:rPr lang="es-ES" smtClean="0"/>
-              <a:t>11/11/2021</a:t>
+              <a:t>12/11/2021</a:t>
             </a:fld>
             <a:endParaRPr lang="es-ES"/>
           </a:p>
@@ -677,7 +677,7 @@
           <a:p>
             <a:fld id="{4DF04138-4ACA-4C8B-9083-6C3A2E96EEC6}" type="datetimeFigureOut">
               <a:rPr lang="ru-RU" smtClean="0"/>
-              <a:t>11.11.2021</a:t>
+              <a:t>12.11.2021</a:t>
             </a:fld>
             <a:endParaRPr lang="ru-RU" dirty="0"/>
           </a:p>
@@ -845,7 +845,7 @@
           <a:p>
             <a:fld id="{4DF04138-4ACA-4C8B-9083-6C3A2E96EEC6}" type="datetimeFigureOut">
               <a:rPr lang="ru-RU" smtClean="0"/>
-              <a:t>11.11.2021</a:t>
+              <a:t>12.11.2021</a:t>
             </a:fld>
             <a:endParaRPr lang="ru-RU" dirty="0"/>
           </a:p>
@@ -1023,7 +1023,7 @@
           <a:p>
             <a:fld id="{4DF04138-4ACA-4C8B-9083-6C3A2E96EEC6}" type="datetimeFigureOut">
               <a:rPr lang="ru-RU" smtClean="0"/>
-              <a:t>11.11.2021</a:t>
+              <a:t>12.11.2021</a:t>
             </a:fld>
             <a:endParaRPr lang="ru-RU" dirty="0"/>
           </a:p>
@@ -1191,7 +1191,7 @@
           <a:p>
             <a:fld id="{4DF04138-4ACA-4C8B-9083-6C3A2E96EEC6}" type="datetimeFigureOut">
               <a:rPr lang="ru-RU" smtClean="0"/>
-              <a:t>11.11.2021</a:t>
+              <a:t>12.11.2021</a:t>
             </a:fld>
             <a:endParaRPr lang="ru-RU" dirty="0"/>
           </a:p>
@@ -1436,7 +1436,7 @@
           <a:p>
             <a:fld id="{4DF04138-4ACA-4C8B-9083-6C3A2E96EEC6}" type="datetimeFigureOut">
               <a:rPr lang="ru-RU" smtClean="0"/>
-              <a:t>11.11.2021</a:t>
+              <a:t>12.11.2021</a:t>
             </a:fld>
             <a:endParaRPr lang="ru-RU" dirty="0"/>
           </a:p>
@@ -1665,7 +1665,7 @@
           <a:p>
             <a:fld id="{4DF04138-4ACA-4C8B-9083-6C3A2E96EEC6}" type="datetimeFigureOut">
               <a:rPr lang="ru-RU" smtClean="0"/>
-              <a:t>11.11.2021</a:t>
+              <a:t>12.11.2021</a:t>
             </a:fld>
             <a:endParaRPr lang="ru-RU" dirty="0"/>
           </a:p>
@@ -2029,7 +2029,7 @@
           <a:p>
             <a:fld id="{4DF04138-4ACA-4C8B-9083-6C3A2E96EEC6}" type="datetimeFigureOut">
               <a:rPr lang="ru-RU" smtClean="0"/>
-              <a:t>11.11.2021</a:t>
+              <a:t>12.11.2021</a:t>
             </a:fld>
             <a:endParaRPr lang="ru-RU" dirty="0"/>
           </a:p>
@@ -2146,7 +2146,7 @@
           <a:p>
             <a:fld id="{4DF04138-4ACA-4C8B-9083-6C3A2E96EEC6}" type="datetimeFigureOut">
               <a:rPr lang="ru-RU" smtClean="0"/>
-              <a:t>11.11.2021</a:t>
+              <a:t>12.11.2021</a:t>
             </a:fld>
             <a:endParaRPr lang="ru-RU" dirty="0"/>
           </a:p>
@@ -2241,7 +2241,7 @@
           <a:p>
             <a:fld id="{4DF04138-4ACA-4C8B-9083-6C3A2E96EEC6}" type="datetimeFigureOut">
               <a:rPr lang="ru-RU" smtClean="0"/>
-              <a:t>11.11.2021</a:t>
+              <a:t>12.11.2021</a:t>
             </a:fld>
             <a:endParaRPr lang="ru-RU" dirty="0"/>
           </a:p>
@@ -2516,7 +2516,7 @@
           <a:p>
             <a:fld id="{4DF04138-4ACA-4C8B-9083-6C3A2E96EEC6}" type="datetimeFigureOut">
               <a:rPr lang="ru-RU" smtClean="0"/>
-              <a:t>11.11.2021</a:t>
+              <a:t>12.11.2021</a:t>
             </a:fld>
             <a:endParaRPr lang="ru-RU" dirty="0"/>
           </a:p>
@@ -2768,7 +2768,7 @@
           <a:p>
             <a:fld id="{4DF04138-4ACA-4C8B-9083-6C3A2E96EEC6}" type="datetimeFigureOut">
               <a:rPr lang="ru-RU" smtClean="0"/>
-              <a:t>11.11.2021</a:t>
+              <a:t>12.11.2021</a:t>
             </a:fld>
             <a:endParaRPr lang="ru-RU" dirty="0"/>
           </a:p>
@@ -2979,7 +2979,7 @@
           <a:p>
             <a:fld id="{4DF04138-4ACA-4C8B-9083-6C3A2E96EEC6}" type="datetimeFigureOut">
               <a:rPr lang="ru-RU" smtClean="0"/>
-              <a:t>11.11.2021</a:t>
+              <a:t>12.11.2021</a:t>
             </a:fld>
             <a:endParaRPr lang="ru-RU" dirty="0"/>
           </a:p>
@@ -3475,7 +3475,7 @@
         <p:spPr>
           <a:xfrm>
             <a:off x="5711483" y="2665708"/>
-            <a:ext cx="6500716" cy="1508105"/>
+            <a:ext cx="6500716" cy="1877437"/>
           </a:xfrm>
           <a:prstGeom prst="rect">
             <a:avLst/>
@@ -3496,7 +3496,7 @@
                 </a:solidFill>
                 <a:latin typeface="Barlow" panose="00000500000000000000" pitchFamily="2" charset="0"/>
               </a:rPr>
-              <a:t>Panel de datos de Turismo de Lanzarote: Una aplicación de datos abiertos en la administración pública</a:t>
+              <a:t>Desarrollo de dashboard para la monitorización de datos en destino turístico: El caso del Panel de Indicadores de Turismo de Lanzarote</a:t>
             </a:r>
             <a:endParaRPr lang="en-US" sz="2000" b="1" dirty="0">
               <a:solidFill>

</xml_diff>